<commit_message>
New final slide added to presentation
</commit_message>
<xml_diff>
--- a/NIS_Komponentno-orientirovannoe_programmirovanie.pptx
+++ b/NIS_Komponentno-orientirovannoe_programmirovanie.pptx
@@ -5,7 +5,7 @@
     <p:sldMasterId id="2147483648" r:id="rId1"/>
   </p:sldMasterIdLst>
   <p:notesMasterIdLst>
-    <p:notesMasterId r:id="rId23"/>
+    <p:notesMasterId r:id="rId24"/>
   </p:notesMasterIdLst>
   <p:sldIdLst>
     <p:sldId id="256" r:id="rId2"/>
@@ -29,6 +29,7 @@
     <p:sldId id="274" r:id="rId20"/>
     <p:sldId id="275" r:id="rId21"/>
     <p:sldId id="276" r:id="rId22"/>
+    <p:sldId id="277" r:id="rId23"/>
   </p:sldIdLst>
   <p:sldSz cx="12192000" cy="6858000"/>
   <p:notesSz cx="6858000" cy="9144000"/>
@@ -17116,289 +17117,214 @@
           </a:p>
         </p:txBody>
       </p:sp>
+      <p:cxnSp>
+        <p:nvCxnSpPr>
+          <p:cNvPr id="7" name="Соединительная линия уступом 6"/>
+          <p:cNvCxnSpPr>
+            <a:endCxn id="30" idx="3"/>
+          </p:cNvCxnSpPr>
+          <p:nvPr/>
+        </p:nvCxnSpPr>
+        <p:spPr>
+          <a:xfrm flipV="1">
+            <a:off x="-8166508" y="4160811"/>
+            <a:ext cx="2286744" cy="1025046"/>
+          </a:xfrm>
+          <a:prstGeom prst="bentConnector2">
+            <a:avLst/>
+          </a:prstGeom>
+          <a:ln w="76200">
+            <a:solidFill>
+              <a:schemeClr val="accent5">
+                <a:lumMod val="75000"/>
+              </a:schemeClr>
+            </a:solidFill>
+          </a:ln>
+        </p:spPr>
+        <p:style>
+          <a:lnRef idx="1">
+            <a:schemeClr val="accent1"/>
+          </a:lnRef>
+          <a:fillRef idx="0">
+            <a:schemeClr val="accent1"/>
+          </a:fillRef>
+          <a:effectRef idx="0">
+            <a:schemeClr val="accent1"/>
+          </a:effectRef>
+          <a:fontRef idx="minor">
+            <a:schemeClr val="tx1"/>
+          </a:fontRef>
+        </p:style>
+      </p:cxnSp>
+      <p:cxnSp>
+        <p:nvCxnSpPr>
+          <p:cNvPr id="8" name="Соединительная линия уступом 7"/>
+          <p:cNvCxnSpPr/>
+          <p:nvPr/>
+        </p:nvCxnSpPr>
+        <p:spPr>
+          <a:xfrm flipV="1">
+            <a:off x="-8166508" y="5063838"/>
+            <a:ext cx="5045877" cy="639174"/>
+          </a:xfrm>
+          <a:prstGeom prst="bentConnector2">
+            <a:avLst/>
+          </a:prstGeom>
+          <a:ln w="76200">
+            <a:solidFill>
+              <a:schemeClr val="accent5">
+                <a:lumMod val="75000"/>
+              </a:schemeClr>
+            </a:solidFill>
+          </a:ln>
+        </p:spPr>
+        <p:style>
+          <a:lnRef idx="1">
+            <a:schemeClr val="accent1"/>
+          </a:lnRef>
+          <a:fillRef idx="0">
+            <a:schemeClr val="accent1"/>
+          </a:fillRef>
+          <a:effectRef idx="0">
+            <a:schemeClr val="accent1"/>
+          </a:effectRef>
+          <a:fontRef idx="minor">
+            <a:schemeClr val="tx1"/>
+          </a:fontRef>
+        </p:style>
+      </p:cxnSp>
+      <p:cxnSp>
+        <p:nvCxnSpPr>
+          <p:cNvPr id="9" name="Соединительная линия уступом 8"/>
+          <p:cNvCxnSpPr>
+            <a:endCxn id="11" idx="3"/>
+          </p:cNvCxnSpPr>
+          <p:nvPr/>
+        </p:nvCxnSpPr>
+        <p:spPr>
+          <a:xfrm rot="5400000" flipH="1" flipV="1">
+            <a:off x="-4658432" y="4007689"/>
+            <a:ext cx="2318964" cy="1071687"/>
+          </a:xfrm>
+          <a:prstGeom prst="bentConnector3">
+            <a:avLst>
+              <a:gd name="adj1" fmla="val 77072"/>
+            </a:avLst>
+          </a:prstGeom>
+          <a:ln w="76200">
+            <a:solidFill>
+              <a:schemeClr val="accent5">
+                <a:lumMod val="75000"/>
+              </a:schemeClr>
+            </a:solidFill>
+          </a:ln>
+        </p:spPr>
+        <p:style>
+          <a:lnRef idx="1">
+            <a:schemeClr val="accent1"/>
+          </a:lnRef>
+          <a:fillRef idx="0">
+            <a:schemeClr val="accent1"/>
+          </a:fillRef>
+          <a:effectRef idx="0">
+            <a:schemeClr val="accent1"/>
+          </a:effectRef>
+          <a:fontRef idx="minor">
+            <a:schemeClr val="tx1"/>
+          </a:fontRef>
+        </p:style>
+      </p:cxnSp>
       <p:grpSp>
         <p:nvGrpSpPr>
-          <p:cNvPr id="48" name="Группа 47"/>
+          <p:cNvPr id="10" name="Группа 9"/>
           <p:cNvGrpSpPr/>
           <p:nvPr/>
         </p:nvGrpSpPr>
         <p:grpSpPr>
-          <a:xfrm>
-            <a:off x="-8229102" y="1707377"/>
-            <a:ext cx="7789533" cy="4254941"/>
-            <a:chOff x="2266054" y="1707377"/>
-            <a:chExt cx="7789533" cy="4254941"/>
+          <a:xfrm flipH="1">
+            <a:off x="-8166508" y="3240574"/>
+            <a:ext cx="3031485" cy="1226982"/>
+            <a:chOff x="3394554" y="2041321"/>
+            <a:chExt cx="2928822" cy="1226982"/>
           </a:xfrm>
         </p:grpSpPr>
         <p:cxnSp>
           <p:nvCxnSpPr>
-            <p:cNvPr id="7" name="Соединительная линия уступом 6"/>
-            <p:cNvCxnSpPr>
-              <a:endCxn id="30" idx="3"/>
-            </p:cNvCxnSpPr>
+            <p:cNvPr id="28" name="Прямая соединительная линия 27"/>
+            <p:cNvCxnSpPr/>
             <p:nvPr/>
           </p:nvCxnSpPr>
           <p:spPr>
             <a:xfrm flipV="1">
-              <a:off x="2328648" y="4160811"/>
-              <a:ext cx="2286744" cy="1025046"/>
+              <a:off x="4735764" y="2659628"/>
+              <a:ext cx="1587612" cy="2788"/>
             </a:xfrm>
-            <a:prstGeom prst="bentConnector2">
+            <a:prstGeom prst="line">
               <a:avLst/>
             </a:prstGeom>
-            <a:ln w="76200">
-              <a:solidFill>
-                <a:schemeClr val="accent5">
-                  <a:lumMod val="75000"/>
-                </a:schemeClr>
-              </a:solidFill>
-            </a:ln>
+            <a:ln w="76200"/>
           </p:spPr>
           <p:style>
             <a:lnRef idx="1">
-              <a:schemeClr val="accent1"/>
+              <a:schemeClr val="dk1"/>
             </a:lnRef>
             <a:fillRef idx="0">
-              <a:schemeClr val="accent1"/>
+              <a:schemeClr val="dk1"/>
             </a:fillRef>
             <a:effectRef idx="0">
-              <a:schemeClr val="accent1"/>
+              <a:schemeClr val="dk1"/>
             </a:effectRef>
             <a:fontRef idx="minor">
               <a:schemeClr val="tx1"/>
             </a:fontRef>
           </p:style>
         </p:cxnSp>
-        <p:cxnSp>
-          <p:nvCxnSpPr>
-            <p:cNvPr id="8" name="Соединительная линия уступом 7"/>
-            <p:cNvCxnSpPr/>
-            <p:nvPr/>
-          </p:nvCxnSpPr>
-          <p:spPr>
-            <a:xfrm flipV="1">
-              <a:off x="2328648" y="5063838"/>
-              <a:ext cx="5045877" cy="639174"/>
-            </a:xfrm>
-            <a:prstGeom prst="bentConnector2">
-              <a:avLst/>
-            </a:prstGeom>
-            <a:ln w="76200">
-              <a:solidFill>
-                <a:schemeClr val="accent5">
-                  <a:lumMod val="75000"/>
-                </a:schemeClr>
-              </a:solidFill>
-            </a:ln>
-          </p:spPr>
-          <p:style>
-            <a:lnRef idx="1">
-              <a:schemeClr val="accent1"/>
-            </a:lnRef>
-            <a:fillRef idx="0">
-              <a:schemeClr val="accent1"/>
-            </a:fillRef>
-            <a:effectRef idx="0">
-              <a:schemeClr val="accent1"/>
-            </a:effectRef>
-            <a:fontRef idx="minor">
-              <a:schemeClr val="tx1"/>
-            </a:fontRef>
-          </p:style>
-        </p:cxnSp>
-        <p:cxnSp>
-          <p:nvCxnSpPr>
-            <p:cNvPr id="9" name="Соединительная линия уступом 8"/>
-            <p:cNvCxnSpPr>
-              <a:endCxn id="11" idx="3"/>
-            </p:cNvCxnSpPr>
-            <p:nvPr/>
-          </p:nvCxnSpPr>
-          <p:spPr>
-            <a:xfrm rot="5400000" flipH="1" flipV="1">
-              <a:off x="5836724" y="4007689"/>
-              <a:ext cx="2318964" cy="1071687"/>
-            </a:xfrm>
-            <a:prstGeom prst="bentConnector3">
-              <a:avLst>
-                <a:gd name="adj1" fmla="val 77072"/>
-              </a:avLst>
-            </a:prstGeom>
-            <a:ln w="76200">
-              <a:solidFill>
-                <a:schemeClr val="accent5">
-                  <a:lumMod val="75000"/>
-                </a:schemeClr>
-              </a:solidFill>
-            </a:ln>
-          </p:spPr>
-          <p:style>
-            <a:lnRef idx="1">
-              <a:schemeClr val="accent1"/>
-            </a:lnRef>
-            <a:fillRef idx="0">
-              <a:schemeClr val="accent1"/>
-            </a:fillRef>
-            <a:effectRef idx="0">
-              <a:schemeClr val="accent1"/>
-            </a:effectRef>
-            <a:fontRef idx="minor">
-              <a:schemeClr val="tx1"/>
-            </a:fontRef>
-          </p:style>
-        </p:cxnSp>
-        <p:grpSp>
-          <p:nvGrpSpPr>
-            <p:cNvPr id="10" name="Группа 9"/>
-            <p:cNvGrpSpPr/>
-            <p:nvPr/>
-          </p:nvGrpSpPr>
-          <p:grpSpPr>
-            <a:xfrm flipH="1">
-              <a:off x="2328648" y="3240574"/>
-              <a:ext cx="3031485" cy="1226982"/>
-              <a:chOff x="3394554" y="2041321"/>
-              <a:chExt cx="2928822" cy="1226982"/>
-            </a:xfrm>
-          </p:grpSpPr>
-          <p:cxnSp>
-            <p:nvCxnSpPr>
-              <p:cNvPr id="28" name="Прямая соединительная линия 27"/>
-              <p:cNvCxnSpPr/>
-              <p:nvPr/>
-            </p:nvCxnSpPr>
-            <p:spPr>
-              <a:xfrm flipV="1">
-                <a:off x="4735764" y="2659628"/>
-                <a:ext cx="1587612" cy="2788"/>
-              </a:xfrm>
-              <a:prstGeom prst="line">
-                <a:avLst/>
-              </a:prstGeom>
-              <a:ln w="76200"/>
-            </p:spPr>
-            <p:style>
-              <a:lnRef idx="1">
-                <a:schemeClr val="dk1"/>
-              </a:lnRef>
-              <a:fillRef idx="0">
-                <a:schemeClr val="dk1"/>
-              </a:fillRef>
-              <a:effectRef idx="0">
-                <a:schemeClr val="dk1"/>
-              </a:effectRef>
-              <a:fontRef idx="minor">
-                <a:schemeClr val="tx1"/>
-              </a:fontRef>
-            </p:style>
-          </p:cxnSp>
-          <p:sp>
-            <p:nvSpPr>
-              <p:cNvPr id="29" name="Прямоугольник 28"/>
-              <p:cNvSpPr/>
-              <p:nvPr/>
-            </p:nvSpPr>
-            <p:spPr>
-              <a:xfrm>
-                <a:off x="5798395" y="2065987"/>
-                <a:ext cx="480412" cy="646331"/>
-              </a:xfrm>
-              <a:prstGeom prst="rect">
-                <a:avLst/>
-              </a:prstGeom>
-            </p:spPr>
-            <p:txBody>
-              <a:bodyPr wrap="none">
-                <a:spAutoFit/>
-              </a:bodyPr>
-              <a:lstStyle/>
-              <a:p>
-                <a:r>
-                  <a:rPr lang="en-US" sz="3600" dirty="0" smtClean="0">
-                    <a:solidFill>
-                      <a:prstClr val="black"/>
-                    </a:solidFill>
-                    <a:latin typeface="Segoe Marker"/>
-                    <a:ea typeface="+mj-ea"/>
-                    <a:cs typeface="+mj-cs"/>
-                  </a:rPr>
-                  <a:t>in</a:t>
-                </a:r>
-                <a:endParaRPr lang="ru-RU" sz="1400" dirty="0"/>
-              </a:p>
-            </p:txBody>
-          </p:sp>
-          <p:sp>
-            <p:nvSpPr>
-              <p:cNvPr id="30" name="Блок-схема: извлечение 29"/>
-              <p:cNvSpPr/>
-              <p:nvPr/>
-            </p:nvSpPr>
-            <p:spPr>
-              <a:xfrm rot="5400000">
-                <a:off x="3500583" y="1935292"/>
-                <a:ext cx="1226982" cy="1439040"/>
-              </a:xfrm>
-              <a:prstGeom prst="flowChartExtract">
-                <a:avLst/>
-              </a:prstGeom>
-              <a:noFill/>
-              <a:ln w="76200">
-                <a:solidFill>
-                  <a:schemeClr val="tx1"/>
-                </a:solidFill>
-              </a:ln>
-            </p:spPr>
-            <p:style>
-              <a:lnRef idx="2">
-                <a:schemeClr val="accent1">
-                  <a:shade val="50000"/>
-                </a:schemeClr>
-              </a:lnRef>
-              <a:fillRef idx="1">
-                <a:schemeClr val="accent1"/>
-              </a:fillRef>
-              <a:effectRef idx="0">
-                <a:schemeClr val="accent1"/>
-              </a:effectRef>
-              <a:fontRef idx="minor">
-                <a:schemeClr val="lt1"/>
-              </a:fontRef>
-            </p:style>
-            <p:txBody>
-              <a:bodyPr vert="vert" wrap="none" tIns="0" bIns="360000" rtlCol="0" anchor="ctr"/>
-              <a:lstStyle/>
-              <a:p>
-                <a:pPr algn="ctr"/>
-                <a:r>
-                  <a:rPr lang="en-US" sz="3100" dirty="0" err="1" smtClean="0">
-                    <a:solidFill>
-                      <a:schemeClr val="tx1"/>
-                    </a:solidFill>
-                    <a:latin typeface="+mj-lt"/>
-                  </a:rPr>
-                  <a:t>DMux</a:t>
-                </a:r>
-                <a:endParaRPr lang="ru-RU" sz="3100" dirty="0">
-                  <a:solidFill>
-                    <a:schemeClr val="tx1"/>
-                  </a:solidFill>
-                  <a:latin typeface="+mj-lt"/>
-                </a:endParaRPr>
-              </a:p>
-            </p:txBody>
-          </p:sp>
-        </p:grpSp>
         <p:sp>
           <p:nvSpPr>
-            <p:cNvPr id="11" name="Блок-схема: извлечение 10"/>
+            <p:cNvPr id="29" name="Прямоугольник 28"/>
             <p:cNvSpPr/>
             <p:nvPr/>
           </p:nvSpPr>
           <p:spPr>
-            <a:xfrm rot="16200000" flipH="1">
-              <a:off x="6801013" y="2116265"/>
-              <a:ext cx="1462073" cy="1804532"/>
+            <a:xfrm>
+              <a:off x="5798395" y="2065987"/>
+              <a:ext cx="480412" cy="646331"/>
+            </a:xfrm>
+            <a:prstGeom prst="rect">
+              <a:avLst/>
+            </a:prstGeom>
+          </p:spPr>
+          <p:txBody>
+            <a:bodyPr wrap="none">
+              <a:spAutoFit/>
+            </a:bodyPr>
+            <a:lstStyle/>
+            <a:p>
+              <a:r>
+                <a:rPr lang="en-US" sz="3600" dirty="0" smtClean="0">
+                  <a:solidFill>
+                    <a:prstClr val="black"/>
+                  </a:solidFill>
+                  <a:latin typeface="Segoe Marker"/>
+                  <a:ea typeface="+mj-ea"/>
+                  <a:cs typeface="+mj-cs"/>
+                </a:rPr>
+                <a:t>in</a:t>
+              </a:r>
+              <a:endParaRPr lang="ru-RU" sz="1400" dirty="0"/>
+            </a:p>
+          </p:txBody>
+        </p:sp>
+        <p:sp>
+          <p:nvSpPr>
+            <p:cNvPr id="30" name="Блок-схема: извлечение 29"/>
+            <p:cNvSpPr/>
+            <p:nvPr/>
+          </p:nvSpPr>
+          <p:spPr>
+            <a:xfrm rot="5400000">
+              <a:off x="3500583" y="1935292"/>
+              <a:ext cx="1226982" cy="1439040"/>
             </a:xfrm>
             <a:prstGeom prst="flowChartExtract">
               <a:avLst/>
@@ -17427,18 +17353,18 @@
             </a:fontRef>
           </p:style>
           <p:txBody>
-            <a:bodyPr vert="vert" wrap="none" tIns="0" bIns="504000" rtlCol="0" anchor="ctr"/>
+            <a:bodyPr vert="vert" wrap="none" tIns="0" bIns="360000" rtlCol="0" anchor="ctr"/>
             <a:lstStyle/>
             <a:p>
               <a:pPr algn="ctr"/>
               <a:r>
-                <a:rPr lang="en-US" sz="2400" dirty="0" smtClean="0">
+                <a:rPr lang="en-US" sz="3100" dirty="0" err="1" smtClean="0">
                   <a:solidFill>
                     <a:schemeClr val="tx1"/>
                   </a:solidFill>
                   <a:latin typeface="+mj-lt"/>
                 </a:rPr>
-                <a:t>DMux4Way</a:t>
+                <a:t>DMux</a:t>
               </a:r>
               <a:endParaRPr lang="ru-RU" sz="3100" dirty="0">
                 <a:solidFill>
@@ -17449,902 +17375,962 @@
             </a:p>
           </p:txBody>
         </p:sp>
-        <p:cxnSp>
-          <p:nvCxnSpPr>
-            <p:cNvPr id="13" name="Соединительная линия уступом 12"/>
-            <p:cNvCxnSpPr>
-              <a:endCxn id="11" idx="0"/>
-            </p:cNvCxnSpPr>
-            <p:nvPr/>
-          </p:nvCxnSpPr>
-          <p:spPr>
-            <a:xfrm flipV="1">
-              <a:off x="5360134" y="3018532"/>
-              <a:ext cx="1269650" cy="569874"/>
-            </a:xfrm>
-            <a:prstGeom prst="bentConnector3">
-              <a:avLst>
-                <a:gd name="adj1" fmla="val 70424"/>
-              </a:avLst>
-            </a:prstGeom>
-            <a:ln w="76200"/>
-          </p:spPr>
-          <p:style>
-            <a:lnRef idx="1">
-              <a:schemeClr val="dk1"/>
-            </a:lnRef>
-            <a:fillRef idx="0">
-              <a:schemeClr val="dk1"/>
-            </a:fillRef>
-            <a:effectRef idx="0">
-              <a:schemeClr val="dk1"/>
-            </a:effectRef>
-            <a:fontRef idx="minor">
+      </p:grpSp>
+      <p:sp>
+        <p:nvSpPr>
+          <p:cNvPr id="11" name="Блок-схема: извлечение 10"/>
+          <p:cNvSpPr/>
+          <p:nvPr/>
+        </p:nvSpPr>
+        <p:spPr>
+          <a:xfrm rot="16200000" flipH="1">
+            <a:off x="-3694143" y="2116265"/>
+            <a:ext cx="1462073" cy="1804532"/>
+          </a:xfrm>
+          <a:prstGeom prst="flowChartExtract">
+            <a:avLst/>
+          </a:prstGeom>
+          <a:noFill/>
+          <a:ln w="76200">
+            <a:solidFill>
               <a:schemeClr val="tx1"/>
-            </a:fontRef>
-          </p:style>
-        </p:cxnSp>
-        <p:cxnSp>
-          <p:nvCxnSpPr>
-            <p:cNvPr id="14" name="Соединительная линия уступом 13"/>
-            <p:cNvCxnSpPr/>
-            <p:nvPr/>
-          </p:nvCxnSpPr>
-          <p:spPr>
-            <a:xfrm>
-              <a:off x="5360134" y="4143600"/>
-              <a:ext cx="1269650" cy="613492"/>
-            </a:xfrm>
-            <a:prstGeom prst="bentConnector3">
-              <a:avLst>
-                <a:gd name="adj1" fmla="val 68274"/>
-              </a:avLst>
-            </a:prstGeom>
-            <a:ln w="76200"/>
-          </p:spPr>
-          <p:style>
-            <a:lnRef idx="1">
-              <a:schemeClr val="dk1"/>
-            </a:lnRef>
-            <a:fillRef idx="0">
-              <a:schemeClr val="dk1"/>
-            </a:fillRef>
-            <a:effectRef idx="0">
-              <a:schemeClr val="dk1"/>
-            </a:effectRef>
-            <a:fontRef idx="minor">
-              <a:schemeClr val="tx1"/>
-            </a:fontRef>
-          </p:style>
-        </p:cxnSp>
-        <p:cxnSp>
-          <p:nvCxnSpPr>
-            <p:cNvPr id="15" name="Прямая соединительная линия 14"/>
-            <p:cNvCxnSpPr/>
-            <p:nvPr/>
-          </p:nvCxnSpPr>
-          <p:spPr>
-            <a:xfrm flipH="1">
-              <a:off x="8392223" y="2400248"/>
-              <a:ext cx="1590584" cy="3380"/>
-            </a:xfrm>
-            <a:prstGeom prst="line">
-              <a:avLst/>
-            </a:prstGeom>
-            <a:ln w="76200"/>
-          </p:spPr>
-          <p:style>
-            <a:lnRef idx="1">
-              <a:schemeClr val="dk1"/>
-            </a:lnRef>
-            <a:fillRef idx="0">
-              <a:schemeClr val="dk1"/>
-            </a:fillRef>
-            <a:effectRef idx="0">
-              <a:schemeClr val="dk1"/>
-            </a:effectRef>
-            <a:fontRef idx="minor">
-              <a:schemeClr val="tx1"/>
-            </a:fontRef>
-          </p:style>
-        </p:cxnSp>
-        <p:cxnSp>
-          <p:nvCxnSpPr>
-            <p:cNvPr id="16" name="Прямая соединительная линия 15"/>
-            <p:cNvCxnSpPr/>
-            <p:nvPr/>
-          </p:nvCxnSpPr>
-          <p:spPr>
-            <a:xfrm flipH="1">
-              <a:off x="8446811" y="2818609"/>
-              <a:ext cx="1590584" cy="3380"/>
-            </a:xfrm>
-            <a:prstGeom prst="line">
-              <a:avLst/>
-            </a:prstGeom>
-            <a:ln w="76200"/>
-          </p:spPr>
-          <p:style>
-            <a:lnRef idx="1">
-              <a:schemeClr val="dk1"/>
-            </a:lnRef>
-            <a:fillRef idx="0">
-              <a:schemeClr val="dk1"/>
-            </a:fillRef>
-            <a:effectRef idx="0">
-              <a:schemeClr val="dk1"/>
-            </a:effectRef>
-            <a:fontRef idx="minor">
-              <a:schemeClr val="tx1"/>
-            </a:fontRef>
-          </p:style>
-        </p:cxnSp>
-        <p:sp>
-          <p:nvSpPr>
-            <p:cNvPr id="19" name="Прямоугольник 18"/>
-            <p:cNvSpPr/>
-            <p:nvPr/>
-          </p:nvSpPr>
-          <p:spPr>
-            <a:xfrm flipH="1">
-              <a:off x="5356973" y="3010140"/>
-              <a:ext cx="962699" cy="646331"/>
-            </a:xfrm>
-            <a:prstGeom prst="rect">
-              <a:avLst/>
-            </a:prstGeom>
-          </p:spPr>
-          <p:txBody>
-            <a:bodyPr wrap="none">
-              <a:spAutoFit/>
-            </a:bodyPr>
-            <a:lstStyle/>
-            <a:p>
-              <a:r>
-                <a:rPr lang="en-US" sz="3600" dirty="0" err="1" smtClean="0">
-                  <a:solidFill>
-                    <a:schemeClr val="bg1">
-                      <a:lumMod val="50000"/>
-                    </a:schemeClr>
-                  </a:solidFill>
-                  <a:latin typeface="Segoe Marker"/>
-                  <a:ea typeface="+mj-ea"/>
-                  <a:cs typeface="+mj-cs"/>
-                </a:rPr>
-                <a:t>abcd</a:t>
-              </a:r>
-              <a:endParaRPr lang="ru-RU" sz="1400" dirty="0">
+            </a:solidFill>
+          </a:ln>
+        </p:spPr>
+        <p:style>
+          <a:lnRef idx="2">
+            <a:schemeClr val="accent1">
+              <a:shade val="50000"/>
+            </a:schemeClr>
+          </a:lnRef>
+          <a:fillRef idx="1">
+            <a:schemeClr val="accent1"/>
+          </a:fillRef>
+          <a:effectRef idx="0">
+            <a:schemeClr val="accent1"/>
+          </a:effectRef>
+          <a:fontRef idx="minor">
+            <a:schemeClr val="lt1"/>
+          </a:fontRef>
+        </p:style>
+        <p:txBody>
+          <a:bodyPr vert="vert" wrap="none" tIns="0" bIns="504000" rtlCol="0" anchor="ctr"/>
+          <a:lstStyle/>
+          <a:p>
+            <a:pPr algn="ctr"/>
+            <a:r>
+              <a:rPr lang="en-US" sz="2400" dirty="0" smtClean="0">
+                <a:solidFill>
+                  <a:schemeClr val="tx1"/>
+                </a:solidFill>
+                <a:latin typeface="+mj-lt"/>
+              </a:rPr>
+              <a:t>DMux4Way</a:t>
+            </a:r>
+            <a:endParaRPr lang="ru-RU" sz="3100" dirty="0">
+              <a:solidFill>
+                <a:schemeClr val="tx1"/>
+              </a:solidFill>
+              <a:latin typeface="+mj-lt"/>
+            </a:endParaRPr>
+          </a:p>
+        </p:txBody>
+      </p:sp>
+      <p:cxnSp>
+        <p:nvCxnSpPr>
+          <p:cNvPr id="13" name="Соединительная линия уступом 12"/>
+          <p:cNvCxnSpPr>
+            <a:endCxn id="11" idx="0"/>
+          </p:cNvCxnSpPr>
+          <p:nvPr/>
+        </p:nvCxnSpPr>
+        <p:spPr>
+          <a:xfrm flipV="1">
+            <a:off x="-5135022" y="3018532"/>
+            <a:ext cx="1269650" cy="569874"/>
+          </a:xfrm>
+          <a:prstGeom prst="bentConnector3">
+            <a:avLst>
+              <a:gd name="adj1" fmla="val 70424"/>
+            </a:avLst>
+          </a:prstGeom>
+          <a:ln w="76200"/>
+        </p:spPr>
+        <p:style>
+          <a:lnRef idx="1">
+            <a:schemeClr val="dk1"/>
+          </a:lnRef>
+          <a:fillRef idx="0">
+            <a:schemeClr val="dk1"/>
+          </a:fillRef>
+          <a:effectRef idx="0">
+            <a:schemeClr val="dk1"/>
+          </a:effectRef>
+          <a:fontRef idx="minor">
+            <a:schemeClr val="tx1"/>
+          </a:fontRef>
+        </p:style>
+      </p:cxnSp>
+      <p:cxnSp>
+        <p:nvCxnSpPr>
+          <p:cNvPr id="14" name="Соединительная линия уступом 13"/>
+          <p:cNvCxnSpPr/>
+          <p:nvPr/>
+        </p:nvCxnSpPr>
+        <p:spPr>
+          <a:xfrm>
+            <a:off x="-5135022" y="4143600"/>
+            <a:ext cx="1269650" cy="613492"/>
+          </a:xfrm>
+          <a:prstGeom prst="bentConnector3">
+            <a:avLst>
+              <a:gd name="adj1" fmla="val 68274"/>
+            </a:avLst>
+          </a:prstGeom>
+          <a:ln w="76200"/>
+        </p:spPr>
+        <p:style>
+          <a:lnRef idx="1">
+            <a:schemeClr val="dk1"/>
+          </a:lnRef>
+          <a:fillRef idx="0">
+            <a:schemeClr val="dk1"/>
+          </a:fillRef>
+          <a:effectRef idx="0">
+            <a:schemeClr val="dk1"/>
+          </a:effectRef>
+          <a:fontRef idx="minor">
+            <a:schemeClr val="tx1"/>
+          </a:fontRef>
+        </p:style>
+      </p:cxnSp>
+      <p:cxnSp>
+        <p:nvCxnSpPr>
+          <p:cNvPr id="15" name="Прямая соединительная линия 14"/>
+          <p:cNvCxnSpPr/>
+          <p:nvPr/>
+        </p:nvCxnSpPr>
+        <p:spPr>
+          <a:xfrm flipH="1">
+            <a:off x="-2060840" y="2403628"/>
+            <a:ext cx="1618999" cy="0"/>
+          </a:xfrm>
+          <a:prstGeom prst="line">
+            <a:avLst/>
+          </a:prstGeom>
+          <a:ln w="76200"/>
+        </p:spPr>
+        <p:style>
+          <a:lnRef idx="1">
+            <a:schemeClr val="dk1"/>
+          </a:lnRef>
+          <a:fillRef idx="0">
+            <a:schemeClr val="dk1"/>
+          </a:fillRef>
+          <a:effectRef idx="0">
+            <a:schemeClr val="dk1"/>
+          </a:effectRef>
+          <a:fontRef idx="minor">
+            <a:schemeClr val="tx1"/>
+          </a:fontRef>
+        </p:style>
+      </p:cxnSp>
+      <p:cxnSp>
+        <p:nvCxnSpPr>
+          <p:cNvPr id="16" name="Прямая соединительная линия 15"/>
+          <p:cNvCxnSpPr/>
+          <p:nvPr/>
+        </p:nvCxnSpPr>
+        <p:spPr>
+          <a:xfrm flipH="1">
+            <a:off x="-2048345" y="2821989"/>
+            <a:ext cx="1606504" cy="0"/>
+          </a:xfrm>
+          <a:prstGeom prst="line">
+            <a:avLst/>
+          </a:prstGeom>
+          <a:ln w="76200"/>
+        </p:spPr>
+        <p:style>
+          <a:lnRef idx="1">
+            <a:schemeClr val="dk1"/>
+          </a:lnRef>
+          <a:fillRef idx="0">
+            <a:schemeClr val="dk1"/>
+          </a:fillRef>
+          <a:effectRef idx="0">
+            <a:schemeClr val="dk1"/>
+          </a:effectRef>
+          <a:fontRef idx="minor">
+            <a:schemeClr val="tx1"/>
+          </a:fontRef>
+        </p:style>
+      </p:cxnSp>
+      <p:sp>
+        <p:nvSpPr>
+          <p:cNvPr id="19" name="Прямоугольник 18"/>
+          <p:cNvSpPr/>
+          <p:nvPr/>
+        </p:nvSpPr>
+        <p:spPr>
+          <a:xfrm flipH="1">
+            <a:off x="-5138183" y="3010140"/>
+            <a:ext cx="962699" cy="646331"/>
+          </a:xfrm>
+          <a:prstGeom prst="rect">
+            <a:avLst/>
+          </a:prstGeom>
+        </p:spPr>
+        <p:txBody>
+          <a:bodyPr wrap="none">
+            <a:spAutoFit/>
+          </a:bodyPr>
+          <a:lstStyle/>
+          <a:p>
+            <a:r>
+              <a:rPr lang="en-US" sz="3600" dirty="0" err="1" smtClean="0">
                 <a:solidFill>
                   <a:schemeClr val="bg1">
                     <a:lumMod val="50000"/>
                   </a:schemeClr>
                 </a:solidFill>
-              </a:endParaRPr>
-            </a:p>
-          </p:txBody>
-        </p:sp>
-        <p:sp>
-          <p:nvSpPr>
-            <p:cNvPr id="20" name="Прямоугольник 19"/>
-            <p:cNvSpPr/>
-            <p:nvPr/>
-          </p:nvSpPr>
-          <p:spPr>
-            <a:xfrm flipH="1">
-              <a:off x="5341308" y="4107177"/>
-              <a:ext cx="925382" cy="646331"/>
-            </a:xfrm>
-            <a:prstGeom prst="rect">
-              <a:avLst/>
-            </a:prstGeom>
-          </p:spPr>
-          <p:txBody>
-            <a:bodyPr wrap="none">
-              <a:spAutoFit/>
-            </a:bodyPr>
-            <a:lstStyle/>
-            <a:p>
-              <a:r>
-                <a:rPr lang="en-US" sz="3600" dirty="0" err="1" smtClean="0">
-                  <a:solidFill>
-                    <a:schemeClr val="bg1">
-                      <a:lumMod val="50000"/>
-                    </a:schemeClr>
-                  </a:solidFill>
-                  <a:latin typeface="Segoe Marker"/>
-                  <a:ea typeface="+mj-ea"/>
-                  <a:cs typeface="+mj-cs"/>
-                </a:rPr>
-                <a:t>efgh</a:t>
-              </a:r>
-              <a:endParaRPr lang="ru-RU" sz="1400" dirty="0">
+                <a:latin typeface="Segoe Marker"/>
+                <a:ea typeface="+mj-ea"/>
+                <a:cs typeface="+mj-cs"/>
+              </a:rPr>
+              <a:t>abcd</a:t>
+            </a:r>
+            <a:endParaRPr lang="ru-RU" sz="1400" dirty="0">
+              <a:solidFill>
+                <a:schemeClr val="bg1">
+                  <a:lumMod val="50000"/>
+                </a:schemeClr>
+              </a:solidFill>
+            </a:endParaRPr>
+          </a:p>
+        </p:txBody>
+      </p:sp>
+      <p:sp>
+        <p:nvSpPr>
+          <p:cNvPr id="20" name="Прямоугольник 19"/>
+          <p:cNvSpPr/>
+          <p:nvPr/>
+        </p:nvSpPr>
+        <p:spPr>
+          <a:xfrm flipH="1">
+            <a:off x="-5153848" y="4107177"/>
+            <a:ext cx="925382" cy="646331"/>
+          </a:xfrm>
+          <a:prstGeom prst="rect">
+            <a:avLst/>
+          </a:prstGeom>
+        </p:spPr>
+        <p:txBody>
+          <a:bodyPr wrap="none">
+            <a:spAutoFit/>
+          </a:bodyPr>
+          <a:lstStyle/>
+          <a:p>
+            <a:r>
+              <a:rPr lang="en-US" sz="3600" dirty="0" err="1" smtClean="0">
                 <a:solidFill>
                   <a:schemeClr val="bg1">
                     <a:lumMod val="50000"/>
                   </a:schemeClr>
                 </a:solidFill>
-              </a:endParaRPr>
-            </a:p>
-          </p:txBody>
-        </p:sp>
-        <p:sp>
-          <p:nvSpPr>
-            <p:cNvPr id="21" name="Прямоугольник 20"/>
-            <p:cNvSpPr/>
-            <p:nvPr/>
-          </p:nvSpPr>
-          <p:spPr>
-            <a:xfrm flipH="1">
-              <a:off x="9631616" y="1823079"/>
-              <a:ext cx="377026" cy="646331"/>
-            </a:xfrm>
-            <a:prstGeom prst="rect">
-              <a:avLst/>
-            </a:prstGeom>
-          </p:spPr>
-          <p:txBody>
-            <a:bodyPr wrap="none">
-              <a:spAutoFit/>
-            </a:bodyPr>
-            <a:lstStyle/>
-            <a:p>
-              <a:r>
-                <a:rPr lang="en-US" sz="3600" dirty="0">
-                  <a:solidFill>
-                    <a:prstClr val="black"/>
-                  </a:solidFill>
-                  <a:latin typeface="Segoe Marker"/>
-                  <a:ea typeface="+mj-ea"/>
-                  <a:cs typeface="+mj-cs"/>
-                </a:rPr>
-                <a:t>a</a:t>
-              </a:r>
-              <a:endParaRPr lang="ru-RU" sz="1400" dirty="0"/>
-            </a:p>
-          </p:txBody>
-        </p:sp>
-        <p:sp>
-          <p:nvSpPr>
-            <p:cNvPr id="22" name="Прямоугольник 21"/>
-            <p:cNvSpPr/>
-            <p:nvPr/>
-          </p:nvSpPr>
-          <p:spPr>
-            <a:xfrm flipH="1">
-              <a:off x="9625578" y="2301883"/>
-              <a:ext cx="397866" cy="646331"/>
-            </a:xfrm>
-            <a:prstGeom prst="rect">
-              <a:avLst/>
-            </a:prstGeom>
-          </p:spPr>
-          <p:txBody>
-            <a:bodyPr wrap="none">
-              <a:spAutoFit/>
-            </a:bodyPr>
-            <a:lstStyle/>
-            <a:p>
-              <a:r>
-                <a:rPr lang="en-US" sz="3600" dirty="0" smtClean="0">
-                  <a:solidFill>
-                    <a:prstClr val="black"/>
-                  </a:solidFill>
-                  <a:latin typeface="Segoe Marker"/>
-                  <a:ea typeface="+mj-ea"/>
-                  <a:cs typeface="+mj-cs"/>
-                </a:rPr>
-                <a:t>b</a:t>
-              </a:r>
-              <a:endParaRPr lang="ru-RU" sz="1400" dirty="0"/>
-            </a:p>
-          </p:txBody>
-        </p:sp>
-        <p:sp>
-          <p:nvSpPr>
-            <p:cNvPr id="23" name="Прямоугольник 22"/>
-            <p:cNvSpPr/>
-            <p:nvPr/>
-          </p:nvSpPr>
-          <p:spPr>
-            <a:xfrm flipH="1">
-              <a:off x="9633882" y="2726114"/>
-              <a:ext cx="351378" cy="646331"/>
-            </a:xfrm>
-            <a:prstGeom prst="rect">
-              <a:avLst/>
-            </a:prstGeom>
-          </p:spPr>
-          <p:txBody>
-            <a:bodyPr wrap="none">
-              <a:spAutoFit/>
-            </a:bodyPr>
-            <a:lstStyle/>
-            <a:p>
-              <a:r>
-                <a:rPr lang="en-US" sz="3600" dirty="0" smtClean="0">
-                  <a:solidFill>
-                    <a:prstClr val="black"/>
-                  </a:solidFill>
-                  <a:latin typeface="Segoe Marker"/>
-                  <a:ea typeface="+mj-ea"/>
-                  <a:cs typeface="+mj-cs"/>
-                </a:rPr>
-                <a:t>c</a:t>
-              </a:r>
-              <a:endParaRPr lang="ru-RU" sz="1400" dirty="0"/>
-            </a:p>
-          </p:txBody>
-        </p:sp>
-        <p:sp>
-          <p:nvSpPr>
-            <p:cNvPr id="24" name="Прямоугольник 23"/>
-            <p:cNvSpPr/>
-            <p:nvPr/>
-          </p:nvSpPr>
-          <p:spPr>
-            <a:xfrm flipH="1">
-              <a:off x="9620234" y="3149194"/>
-              <a:ext cx="397866" cy="646331"/>
-            </a:xfrm>
-            <a:prstGeom prst="rect">
-              <a:avLst/>
-            </a:prstGeom>
-          </p:spPr>
-          <p:txBody>
-            <a:bodyPr wrap="none">
-              <a:spAutoFit/>
-            </a:bodyPr>
-            <a:lstStyle/>
-            <a:p>
-              <a:r>
-                <a:rPr lang="en-US" sz="3600" dirty="0" smtClean="0">
-                  <a:solidFill>
-                    <a:prstClr val="black"/>
-                  </a:solidFill>
-                  <a:latin typeface="Segoe Marker"/>
-                  <a:ea typeface="+mj-ea"/>
-                  <a:cs typeface="+mj-cs"/>
-                </a:rPr>
-                <a:t>d</a:t>
-              </a:r>
-              <a:endParaRPr lang="ru-RU" sz="1400" dirty="0"/>
-            </a:p>
-          </p:txBody>
-        </p:sp>
-        <p:sp>
-          <p:nvSpPr>
-            <p:cNvPr id="25" name="Прямоугольник 24"/>
-            <p:cNvSpPr/>
-            <p:nvPr/>
-          </p:nvSpPr>
-          <p:spPr>
-            <a:xfrm>
-              <a:off x="3728314" y="1707377"/>
-              <a:ext cx="5449595" cy="4254941"/>
-            </a:xfrm>
-            <a:prstGeom prst="rect">
-              <a:avLst/>
-            </a:prstGeom>
-            <a:noFill/>
-            <a:ln w="28575">
+                <a:latin typeface="Segoe Marker"/>
+                <a:ea typeface="+mj-ea"/>
+                <a:cs typeface="+mj-cs"/>
+              </a:rPr>
+              <a:t>efgh</a:t>
+            </a:r>
+            <a:endParaRPr lang="ru-RU" sz="1400" dirty="0">
               <a:solidFill>
                 <a:schemeClr val="bg1">
                   <a:lumMod val="50000"/>
                 </a:schemeClr>
               </a:solidFill>
-              <a:prstDash val="lgDash"/>
-            </a:ln>
-          </p:spPr>
-          <p:style>
-            <a:lnRef idx="2">
-              <a:schemeClr val="accent1">
-                <a:shade val="50000"/>
+            </a:endParaRPr>
+          </a:p>
+        </p:txBody>
+      </p:sp>
+      <p:sp>
+        <p:nvSpPr>
+          <p:cNvPr id="21" name="Прямоугольник 20"/>
+          <p:cNvSpPr/>
+          <p:nvPr/>
+        </p:nvSpPr>
+        <p:spPr>
+          <a:xfrm flipH="1">
+            <a:off x="-863540" y="1823079"/>
+            <a:ext cx="377026" cy="646331"/>
+          </a:xfrm>
+          <a:prstGeom prst="rect">
+            <a:avLst/>
+          </a:prstGeom>
+        </p:spPr>
+        <p:txBody>
+          <a:bodyPr wrap="none">
+            <a:spAutoFit/>
+          </a:bodyPr>
+          <a:lstStyle/>
+          <a:p>
+            <a:r>
+              <a:rPr lang="en-US" sz="3600" dirty="0">
+                <a:solidFill>
+                  <a:prstClr val="black"/>
+                </a:solidFill>
+                <a:latin typeface="Segoe Marker"/>
+                <a:ea typeface="+mj-ea"/>
+                <a:cs typeface="+mj-cs"/>
+              </a:rPr>
+              <a:t>a</a:t>
+            </a:r>
+            <a:endParaRPr lang="ru-RU" sz="1400" dirty="0"/>
+          </a:p>
+        </p:txBody>
+      </p:sp>
+      <p:sp>
+        <p:nvSpPr>
+          <p:cNvPr id="22" name="Прямоугольник 21"/>
+          <p:cNvSpPr/>
+          <p:nvPr/>
+        </p:nvSpPr>
+        <p:spPr>
+          <a:xfrm flipH="1">
+            <a:off x="-869578" y="2301883"/>
+            <a:ext cx="397866" cy="646331"/>
+          </a:xfrm>
+          <a:prstGeom prst="rect">
+            <a:avLst/>
+          </a:prstGeom>
+        </p:spPr>
+        <p:txBody>
+          <a:bodyPr wrap="none">
+            <a:spAutoFit/>
+          </a:bodyPr>
+          <a:lstStyle/>
+          <a:p>
+            <a:r>
+              <a:rPr lang="en-US" sz="3600" dirty="0" smtClean="0">
+                <a:solidFill>
+                  <a:prstClr val="black"/>
+                </a:solidFill>
+                <a:latin typeface="Segoe Marker"/>
+                <a:ea typeface="+mj-ea"/>
+                <a:cs typeface="+mj-cs"/>
+              </a:rPr>
+              <a:t>b</a:t>
+            </a:r>
+            <a:endParaRPr lang="ru-RU" sz="1400" dirty="0"/>
+          </a:p>
+        </p:txBody>
+      </p:sp>
+      <p:sp>
+        <p:nvSpPr>
+          <p:cNvPr id="23" name="Прямоугольник 22"/>
+          <p:cNvSpPr/>
+          <p:nvPr/>
+        </p:nvSpPr>
+        <p:spPr>
+          <a:xfrm flipH="1">
+            <a:off x="-861274" y="2726114"/>
+            <a:ext cx="351378" cy="646331"/>
+          </a:xfrm>
+          <a:prstGeom prst="rect">
+            <a:avLst/>
+          </a:prstGeom>
+        </p:spPr>
+        <p:txBody>
+          <a:bodyPr wrap="none">
+            <a:spAutoFit/>
+          </a:bodyPr>
+          <a:lstStyle/>
+          <a:p>
+            <a:r>
+              <a:rPr lang="en-US" sz="3600" dirty="0" smtClean="0">
+                <a:solidFill>
+                  <a:prstClr val="black"/>
+                </a:solidFill>
+                <a:latin typeface="Segoe Marker"/>
+                <a:ea typeface="+mj-ea"/>
+                <a:cs typeface="+mj-cs"/>
+              </a:rPr>
+              <a:t>c</a:t>
+            </a:r>
+            <a:endParaRPr lang="ru-RU" sz="1400" dirty="0"/>
+          </a:p>
+        </p:txBody>
+      </p:sp>
+      <p:sp>
+        <p:nvSpPr>
+          <p:cNvPr id="24" name="Прямоугольник 23"/>
+          <p:cNvSpPr/>
+          <p:nvPr/>
+        </p:nvSpPr>
+        <p:spPr>
+          <a:xfrm flipH="1">
+            <a:off x="-874922" y="3149194"/>
+            <a:ext cx="397866" cy="646331"/>
+          </a:xfrm>
+          <a:prstGeom prst="rect">
+            <a:avLst/>
+          </a:prstGeom>
+        </p:spPr>
+        <p:txBody>
+          <a:bodyPr wrap="none">
+            <a:spAutoFit/>
+          </a:bodyPr>
+          <a:lstStyle/>
+          <a:p>
+            <a:r>
+              <a:rPr lang="en-US" sz="3600" dirty="0" smtClean="0">
+                <a:solidFill>
+                  <a:prstClr val="black"/>
+                </a:solidFill>
+                <a:latin typeface="Segoe Marker"/>
+                <a:ea typeface="+mj-ea"/>
+                <a:cs typeface="+mj-cs"/>
+              </a:rPr>
+              <a:t>d</a:t>
+            </a:r>
+            <a:endParaRPr lang="ru-RU" sz="1400" dirty="0"/>
+          </a:p>
+        </p:txBody>
+      </p:sp>
+      <p:sp>
+        <p:nvSpPr>
+          <p:cNvPr id="25" name="Прямоугольник 24"/>
+          <p:cNvSpPr/>
+          <p:nvPr/>
+        </p:nvSpPr>
+        <p:spPr>
+          <a:xfrm>
+            <a:off x="-6766842" y="1707377"/>
+            <a:ext cx="5449595" cy="4254941"/>
+          </a:xfrm>
+          <a:prstGeom prst="rect">
+            <a:avLst/>
+          </a:prstGeom>
+          <a:noFill/>
+          <a:ln w="28575">
+            <a:solidFill>
+              <a:schemeClr val="bg1">
+                <a:lumMod val="50000"/>
               </a:schemeClr>
-            </a:lnRef>
-            <a:fillRef idx="1">
-              <a:schemeClr val="accent1"/>
-            </a:fillRef>
-            <a:effectRef idx="0">
-              <a:schemeClr val="accent1"/>
-            </a:effectRef>
-            <a:fontRef idx="minor">
-              <a:schemeClr val="lt1"/>
-            </a:fontRef>
-          </p:style>
-          <p:txBody>
-            <a:bodyPr rtlCol="0" anchor="ctr"/>
-            <a:lstStyle/>
-            <a:p>
-              <a:pPr algn="ctr"/>
-              <a:endParaRPr lang="ru-RU"/>
-            </a:p>
-          </p:txBody>
-        </p:sp>
-        <p:sp>
-          <p:nvSpPr>
-            <p:cNvPr id="26" name="Прямоугольник 25"/>
-            <p:cNvSpPr/>
-            <p:nvPr/>
-          </p:nvSpPr>
-          <p:spPr>
-            <a:xfrm flipH="1">
-              <a:off x="2304727" y="4525878"/>
-              <a:ext cx="1082348" cy="646331"/>
-            </a:xfrm>
-            <a:prstGeom prst="rect">
-              <a:avLst/>
-            </a:prstGeom>
-          </p:spPr>
-          <p:txBody>
-            <a:bodyPr wrap="none">
-              <a:spAutoFit/>
-            </a:bodyPr>
-            <a:lstStyle/>
-            <a:p>
-              <a:r>
-                <a:rPr lang="en-US" sz="3600" dirty="0" err="1" smtClean="0">
-                  <a:solidFill>
-                    <a:prstClr val="black"/>
-                  </a:solidFill>
-                  <a:latin typeface="Segoe Marker"/>
-                  <a:ea typeface="+mj-ea"/>
-                  <a:cs typeface="+mj-cs"/>
-                </a:rPr>
-                <a:t>sel</a:t>
-              </a:r>
-              <a:r>
-                <a:rPr lang="en-US" sz="3600" dirty="0" smtClean="0">
-                  <a:solidFill>
-                    <a:prstClr val="black"/>
-                  </a:solidFill>
-                  <a:latin typeface="Segoe Marker"/>
-                  <a:ea typeface="+mj-ea"/>
-                  <a:cs typeface="+mj-cs"/>
-                </a:rPr>
-                <a:t>[2]</a:t>
-              </a:r>
-              <a:endParaRPr lang="ru-RU" sz="1400" dirty="0"/>
-            </a:p>
-          </p:txBody>
-        </p:sp>
-        <p:sp>
-          <p:nvSpPr>
-            <p:cNvPr id="27" name="Прямоугольник 26"/>
-            <p:cNvSpPr/>
-            <p:nvPr/>
-          </p:nvSpPr>
-          <p:spPr>
-            <a:xfrm flipH="1">
-              <a:off x="2266054" y="5101362"/>
-              <a:ext cx="1462260" cy="646331"/>
-            </a:xfrm>
-            <a:prstGeom prst="rect">
-              <a:avLst/>
-            </a:prstGeom>
-          </p:spPr>
-          <p:txBody>
-            <a:bodyPr wrap="none">
-              <a:spAutoFit/>
-            </a:bodyPr>
-            <a:lstStyle/>
-            <a:p>
-              <a:r>
-                <a:rPr lang="en-US" sz="3600" dirty="0" err="1" smtClean="0">
-                  <a:solidFill>
-                    <a:prstClr val="black"/>
-                  </a:solidFill>
-                  <a:latin typeface="Segoe Marker"/>
-                  <a:ea typeface="+mj-ea"/>
-                  <a:cs typeface="+mj-cs"/>
-                </a:rPr>
-                <a:t>sel</a:t>
-              </a:r>
-              <a:r>
-                <a:rPr lang="en-US" sz="3600" dirty="0" smtClean="0">
-                  <a:solidFill>
-                    <a:prstClr val="black"/>
-                  </a:solidFill>
-                  <a:latin typeface="Segoe Marker"/>
-                  <a:ea typeface="+mj-ea"/>
-                  <a:cs typeface="+mj-cs"/>
-                </a:rPr>
-                <a:t>[0..1]</a:t>
-              </a:r>
-              <a:endParaRPr lang="ru-RU" sz="1400" dirty="0"/>
-            </a:p>
-          </p:txBody>
-        </p:sp>
-        <p:cxnSp>
-          <p:nvCxnSpPr>
-            <p:cNvPr id="36" name="Прямая соединительная линия 35"/>
-            <p:cNvCxnSpPr/>
-            <p:nvPr/>
-          </p:nvCxnSpPr>
-          <p:spPr>
-            <a:xfrm flipH="1">
-              <a:off x="8462731" y="3667055"/>
-              <a:ext cx="1590584" cy="3380"/>
-            </a:xfrm>
-            <a:prstGeom prst="line">
-              <a:avLst/>
-            </a:prstGeom>
-            <a:ln w="76200"/>
-          </p:spPr>
-          <p:style>
-            <a:lnRef idx="1">
-              <a:schemeClr val="dk1"/>
-            </a:lnRef>
-            <a:fillRef idx="0">
-              <a:schemeClr val="dk1"/>
-            </a:fillRef>
-            <a:effectRef idx="0">
-              <a:schemeClr val="dk1"/>
-            </a:effectRef>
-            <a:fontRef idx="minor">
+            </a:solidFill>
+            <a:prstDash val="lgDash"/>
+          </a:ln>
+        </p:spPr>
+        <p:style>
+          <a:lnRef idx="2">
+            <a:schemeClr val="accent1">
+              <a:shade val="50000"/>
+            </a:schemeClr>
+          </a:lnRef>
+          <a:fillRef idx="1">
+            <a:schemeClr val="accent1"/>
+          </a:fillRef>
+          <a:effectRef idx="0">
+            <a:schemeClr val="accent1"/>
+          </a:effectRef>
+          <a:fontRef idx="minor">
+            <a:schemeClr val="lt1"/>
+          </a:fontRef>
+        </p:style>
+        <p:txBody>
+          <a:bodyPr rtlCol="0" anchor="ctr"/>
+          <a:lstStyle/>
+          <a:p>
+            <a:pPr algn="ctr"/>
+            <a:endParaRPr lang="ru-RU"/>
+          </a:p>
+        </p:txBody>
+      </p:sp>
+      <p:sp>
+        <p:nvSpPr>
+          <p:cNvPr id="26" name="Прямоугольник 25"/>
+          <p:cNvSpPr/>
+          <p:nvPr/>
+        </p:nvSpPr>
+        <p:spPr>
+          <a:xfrm flipH="1">
+            <a:off x="-8190429" y="4525878"/>
+            <a:ext cx="1082348" cy="646331"/>
+          </a:xfrm>
+          <a:prstGeom prst="rect">
+            <a:avLst/>
+          </a:prstGeom>
+        </p:spPr>
+        <p:txBody>
+          <a:bodyPr wrap="none">
+            <a:spAutoFit/>
+          </a:bodyPr>
+          <a:lstStyle/>
+          <a:p>
+            <a:r>
+              <a:rPr lang="en-US" sz="3600" dirty="0" err="1" smtClean="0">
+                <a:solidFill>
+                  <a:prstClr val="black"/>
+                </a:solidFill>
+                <a:latin typeface="Segoe Marker"/>
+                <a:ea typeface="+mj-ea"/>
+                <a:cs typeface="+mj-cs"/>
+              </a:rPr>
+              <a:t>sel</a:t>
+            </a:r>
+            <a:r>
+              <a:rPr lang="en-US" sz="3600" dirty="0" smtClean="0">
+                <a:solidFill>
+                  <a:prstClr val="black"/>
+                </a:solidFill>
+                <a:latin typeface="Segoe Marker"/>
+                <a:ea typeface="+mj-ea"/>
+                <a:cs typeface="+mj-cs"/>
+              </a:rPr>
+              <a:t>[2]</a:t>
+            </a:r>
+            <a:endParaRPr lang="ru-RU" sz="1400" dirty="0"/>
+          </a:p>
+        </p:txBody>
+      </p:sp>
+      <p:sp>
+        <p:nvSpPr>
+          <p:cNvPr id="27" name="Прямоугольник 26"/>
+          <p:cNvSpPr/>
+          <p:nvPr/>
+        </p:nvSpPr>
+        <p:spPr>
+          <a:xfrm flipH="1">
+            <a:off x="-8229102" y="5101362"/>
+            <a:ext cx="1462260" cy="646331"/>
+          </a:xfrm>
+          <a:prstGeom prst="rect">
+            <a:avLst/>
+          </a:prstGeom>
+        </p:spPr>
+        <p:txBody>
+          <a:bodyPr wrap="none">
+            <a:spAutoFit/>
+          </a:bodyPr>
+          <a:lstStyle/>
+          <a:p>
+            <a:r>
+              <a:rPr lang="en-US" sz="3600" dirty="0" err="1" smtClean="0">
+                <a:solidFill>
+                  <a:prstClr val="black"/>
+                </a:solidFill>
+                <a:latin typeface="Segoe Marker"/>
+                <a:ea typeface="+mj-ea"/>
+                <a:cs typeface="+mj-cs"/>
+              </a:rPr>
+              <a:t>sel</a:t>
+            </a:r>
+            <a:r>
+              <a:rPr lang="en-US" sz="3600" dirty="0" smtClean="0">
+                <a:solidFill>
+                  <a:prstClr val="black"/>
+                </a:solidFill>
+                <a:latin typeface="Segoe Marker"/>
+                <a:ea typeface="+mj-ea"/>
+                <a:cs typeface="+mj-cs"/>
+              </a:rPr>
+              <a:t>[0..1]</a:t>
+            </a:r>
+            <a:endParaRPr lang="ru-RU" sz="1400" dirty="0"/>
+          </a:p>
+        </p:txBody>
+      </p:sp>
+      <p:cxnSp>
+        <p:nvCxnSpPr>
+          <p:cNvPr id="36" name="Прямая соединительная линия 35"/>
+          <p:cNvCxnSpPr/>
+          <p:nvPr/>
+        </p:nvCxnSpPr>
+        <p:spPr>
+          <a:xfrm flipH="1">
+            <a:off x="-2032425" y="3667055"/>
+            <a:ext cx="1590584" cy="3380"/>
+          </a:xfrm>
+          <a:prstGeom prst="line">
+            <a:avLst/>
+          </a:prstGeom>
+          <a:ln w="76200"/>
+        </p:spPr>
+        <p:style>
+          <a:lnRef idx="1">
+            <a:schemeClr val="dk1"/>
+          </a:lnRef>
+          <a:fillRef idx="0">
+            <a:schemeClr val="dk1"/>
+          </a:fillRef>
+          <a:effectRef idx="0">
+            <a:schemeClr val="dk1"/>
+          </a:effectRef>
+          <a:fontRef idx="minor">
+            <a:schemeClr val="tx1"/>
+          </a:fontRef>
+        </p:style>
+      </p:cxnSp>
+      <p:cxnSp>
+        <p:nvCxnSpPr>
+          <p:cNvPr id="37" name="Прямая соединительная линия 36"/>
+          <p:cNvCxnSpPr/>
+          <p:nvPr/>
+        </p:nvCxnSpPr>
+        <p:spPr>
+          <a:xfrm flipH="1">
+            <a:off x="-2059721" y="3260997"/>
+            <a:ext cx="1617880" cy="0"/>
+          </a:xfrm>
+          <a:prstGeom prst="line">
+            <a:avLst/>
+          </a:prstGeom>
+          <a:ln w="76200"/>
+        </p:spPr>
+        <p:style>
+          <a:lnRef idx="1">
+            <a:schemeClr val="dk1"/>
+          </a:lnRef>
+          <a:fillRef idx="0">
+            <a:schemeClr val="dk1"/>
+          </a:fillRef>
+          <a:effectRef idx="0">
+            <a:schemeClr val="dk1"/>
+          </a:effectRef>
+          <a:fontRef idx="minor">
+            <a:schemeClr val="tx1"/>
+          </a:fontRef>
+        </p:style>
+      </p:cxnSp>
+      <p:sp>
+        <p:nvSpPr>
+          <p:cNvPr id="38" name="Блок-схема: извлечение 37"/>
+          <p:cNvSpPr/>
+          <p:nvPr/>
+        </p:nvSpPr>
+        <p:spPr>
+          <a:xfrm rot="16200000" flipH="1">
+            <a:off x="-3691871" y="3865454"/>
+            <a:ext cx="1462073" cy="1804532"/>
+          </a:xfrm>
+          <a:prstGeom prst="flowChartExtract">
+            <a:avLst/>
+          </a:prstGeom>
+          <a:noFill/>
+          <a:ln w="76200">
+            <a:solidFill>
               <a:schemeClr val="tx1"/>
-            </a:fontRef>
-          </p:style>
-        </p:cxnSp>
-        <p:cxnSp>
-          <p:nvCxnSpPr>
-            <p:cNvPr id="37" name="Прямая соединительная линия 36"/>
-            <p:cNvCxnSpPr/>
-            <p:nvPr/>
-          </p:nvCxnSpPr>
-          <p:spPr>
-            <a:xfrm flipH="1">
-              <a:off x="8435435" y="3257617"/>
-              <a:ext cx="1590584" cy="3380"/>
-            </a:xfrm>
-            <a:prstGeom prst="line">
-              <a:avLst/>
-            </a:prstGeom>
-            <a:ln w="76200"/>
-          </p:spPr>
-          <p:style>
-            <a:lnRef idx="1">
-              <a:schemeClr val="dk1"/>
-            </a:lnRef>
-            <a:fillRef idx="0">
-              <a:schemeClr val="dk1"/>
-            </a:fillRef>
-            <a:effectRef idx="0">
-              <a:schemeClr val="dk1"/>
-            </a:effectRef>
-            <a:fontRef idx="minor">
-              <a:schemeClr val="tx1"/>
-            </a:fontRef>
-          </p:style>
-        </p:cxnSp>
-        <p:sp>
-          <p:nvSpPr>
-            <p:cNvPr id="38" name="Блок-схема: извлечение 37"/>
-            <p:cNvSpPr/>
-            <p:nvPr/>
-          </p:nvSpPr>
-          <p:spPr>
-            <a:xfrm rot="16200000" flipH="1">
-              <a:off x="6803285" y="3865454"/>
-              <a:ext cx="1462073" cy="1804532"/>
-            </a:xfrm>
-            <a:prstGeom prst="flowChartExtract">
-              <a:avLst/>
-            </a:prstGeom>
-            <a:noFill/>
-            <a:ln w="76200">
-              <a:solidFill>
-                <a:schemeClr val="tx1"/>
-              </a:solidFill>
-            </a:ln>
-          </p:spPr>
-          <p:style>
-            <a:lnRef idx="2">
-              <a:schemeClr val="accent1">
-                <a:shade val="50000"/>
-              </a:schemeClr>
-            </a:lnRef>
-            <a:fillRef idx="1">
-              <a:schemeClr val="accent1"/>
-            </a:fillRef>
-            <a:effectRef idx="0">
-              <a:schemeClr val="accent1"/>
-            </a:effectRef>
-            <a:fontRef idx="minor">
-              <a:schemeClr val="lt1"/>
-            </a:fontRef>
-          </p:style>
-          <p:txBody>
-            <a:bodyPr vert="vert" wrap="none" tIns="0" bIns="504000" rtlCol="0" anchor="ctr"/>
-            <a:lstStyle/>
-            <a:p>
-              <a:pPr algn="ctr"/>
-              <a:r>
-                <a:rPr lang="en-US" sz="2400" dirty="0" smtClean="0">
-                  <a:solidFill>
-                    <a:schemeClr val="tx1"/>
-                  </a:solidFill>
-                  <a:latin typeface="+mj-lt"/>
-                </a:rPr>
-                <a:t>DMux4Way</a:t>
-              </a:r>
-              <a:endParaRPr lang="ru-RU" sz="3100" dirty="0">
+            </a:solidFill>
+          </a:ln>
+        </p:spPr>
+        <p:style>
+          <a:lnRef idx="2">
+            <a:schemeClr val="accent1">
+              <a:shade val="50000"/>
+            </a:schemeClr>
+          </a:lnRef>
+          <a:fillRef idx="1">
+            <a:schemeClr val="accent1"/>
+          </a:fillRef>
+          <a:effectRef idx="0">
+            <a:schemeClr val="accent1"/>
+          </a:effectRef>
+          <a:fontRef idx="minor">
+            <a:schemeClr val="lt1"/>
+          </a:fontRef>
+        </p:style>
+        <p:txBody>
+          <a:bodyPr vert="vert" wrap="none" tIns="0" bIns="504000" rtlCol="0" anchor="ctr"/>
+          <a:lstStyle/>
+          <a:p>
+            <a:pPr algn="ctr"/>
+            <a:r>
+              <a:rPr lang="en-US" sz="2400" dirty="0" smtClean="0">
                 <a:solidFill>
                   <a:schemeClr val="tx1"/>
                 </a:solidFill>
                 <a:latin typeface="+mj-lt"/>
-              </a:endParaRPr>
-            </a:p>
-          </p:txBody>
-        </p:sp>
-        <p:cxnSp>
-          <p:nvCxnSpPr>
-            <p:cNvPr id="39" name="Прямая соединительная линия 38"/>
-            <p:cNvCxnSpPr/>
-            <p:nvPr/>
-          </p:nvCxnSpPr>
-          <p:spPr>
-            <a:xfrm flipH="1">
-              <a:off x="8394495" y="4149437"/>
-              <a:ext cx="1590584" cy="3380"/>
-            </a:xfrm>
-            <a:prstGeom prst="line">
-              <a:avLst/>
-            </a:prstGeom>
-            <a:ln w="76200"/>
-          </p:spPr>
-          <p:style>
-            <a:lnRef idx="1">
-              <a:schemeClr val="dk1"/>
-            </a:lnRef>
-            <a:fillRef idx="0">
-              <a:schemeClr val="dk1"/>
-            </a:fillRef>
-            <a:effectRef idx="0">
-              <a:schemeClr val="dk1"/>
-            </a:effectRef>
-            <a:fontRef idx="minor">
-              <a:schemeClr val="tx1"/>
-            </a:fontRef>
-          </p:style>
-        </p:cxnSp>
-        <p:cxnSp>
-          <p:nvCxnSpPr>
-            <p:cNvPr id="40" name="Прямая соединительная линия 39"/>
-            <p:cNvCxnSpPr/>
-            <p:nvPr/>
-          </p:nvCxnSpPr>
-          <p:spPr>
-            <a:xfrm flipH="1">
-              <a:off x="8449083" y="4567798"/>
-              <a:ext cx="1590584" cy="3380"/>
-            </a:xfrm>
-            <a:prstGeom prst="line">
-              <a:avLst/>
-            </a:prstGeom>
-            <a:ln w="76200"/>
-          </p:spPr>
-          <p:style>
-            <a:lnRef idx="1">
-              <a:schemeClr val="dk1"/>
-            </a:lnRef>
-            <a:fillRef idx="0">
-              <a:schemeClr val="dk1"/>
-            </a:fillRef>
-            <a:effectRef idx="0">
-              <a:schemeClr val="dk1"/>
-            </a:effectRef>
-            <a:fontRef idx="minor">
-              <a:schemeClr val="tx1"/>
-            </a:fontRef>
-          </p:style>
-        </p:cxnSp>
-        <p:sp>
-          <p:nvSpPr>
-            <p:cNvPr id="41" name="Прямоугольник 40"/>
-            <p:cNvSpPr/>
-            <p:nvPr/>
-          </p:nvSpPr>
-          <p:spPr>
-            <a:xfrm flipH="1">
-              <a:off x="9633888" y="3572268"/>
-              <a:ext cx="377026" cy="646331"/>
-            </a:xfrm>
-            <a:prstGeom prst="rect">
-              <a:avLst/>
-            </a:prstGeom>
-          </p:spPr>
-          <p:txBody>
-            <a:bodyPr wrap="none">
-              <a:spAutoFit/>
-            </a:bodyPr>
-            <a:lstStyle/>
-            <a:p>
-              <a:r>
-                <a:rPr lang="en-US" sz="3600" dirty="0" smtClean="0">
-                  <a:solidFill>
-                    <a:prstClr val="black"/>
-                  </a:solidFill>
-                  <a:latin typeface="Segoe Marker"/>
-                  <a:ea typeface="+mj-ea"/>
-                  <a:cs typeface="+mj-cs"/>
-                </a:rPr>
-                <a:t>e</a:t>
-              </a:r>
-              <a:endParaRPr lang="ru-RU" sz="1400" dirty="0"/>
-            </a:p>
-          </p:txBody>
-        </p:sp>
-        <p:sp>
-          <p:nvSpPr>
-            <p:cNvPr id="42" name="Прямоугольник 41"/>
-            <p:cNvSpPr/>
-            <p:nvPr/>
-          </p:nvSpPr>
-          <p:spPr>
-            <a:xfrm flipH="1">
-              <a:off x="9627850" y="4051072"/>
-              <a:ext cx="316112" cy="646331"/>
-            </a:xfrm>
-            <a:prstGeom prst="rect">
-              <a:avLst/>
-            </a:prstGeom>
-          </p:spPr>
-          <p:txBody>
-            <a:bodyPr wrap="none">
-              <a:spAutoFit/>
-            </a:bodyPr>
-            <a:lstStyle/>
-            <a:p>
-              <a:r>
-                <a:rPr lang="en-US" sz="3600" dirty="0">
-                  <a:solidFill>
-                    <a:prstClr val="black"/>
-                  </a:solidFill>
-                  <a:latin typeface="Segoe Marker"/>
-                  <a:ea typeface="+mj-ea"/>
-                  <a:cs typeface="+mj-cs"/>
-                </a:rPr>
-                <a:t>f</a:t>
-              </a:r>
-              <a:endParaRPr lang="ru-RU" sz="1400" dirty="0"/>
-            </a:p>
-          </p:txBody>
-        </p:sp>
-        <p:sp>
-          <p:nvSpPr>
-            <p:cNvPr id="43" name="Прямоугольник 42"/>
-            <p:cNvSpPr/>
-            <p:nvPr/>
-          </p:nvSpPr>
-          <p:spPr>
-            <a:xfrm flipH="1">
-              <a:off x="9636154" y="4420711"/>
-              <a:ext cx="397866" cy="646331"/>
-            </a:xfrm>
-            <a:prstGeom prst="rect">
-              <a:avLst/>
-            </a:prstGeom>
-          </p:spPr>
-          <p:txBody>
-            <a:bodyPr wrap="none">
-              <a:spAutoFit/>
-            </a:bodyPr>
-            <a:lstStyle/>
-            <a:p>
-              <a:r>
-                <a:rPr lang="en-US" sz="3600" dirty="0">
-                  <a:solidFill>
-                    <a:prstClr val="black"/>
-                  </a:solidFill>
-                  <a:latin typeface="Segoe Marker"/>
-                  <a:ea typeface="+mj-ea"/>
-                  <a:cs typeface="+mj-cs"/>
-                </a:rPr>
-                <a:t>g</a:t>
-              </a:r>
-              <a:endParaRPr lang="ru-RU" sz="1400" dirty="0"/>
-            </a:p>
-          </p:txBody>
-        </p:sp>
-        <p:sp>
-          <p:nvSpPr>
-            <p:cNvPr id="44" name="Прямоугольник 43"/>
-            <p:cNvSpPr/>
-            <p:nvPr/>
-          </p:nvSpPr>
-          <p:spPr>
-            <a:xfrm flipH="1">
-              <a:off x="9622506" y="4898383"/>
-              <a:ext cx="396262" cy="646331"/>
-            </a:xfrm>
-            <a:prstGeom prst="rect">
-              <a:avLst/>
-            </a:prstGeom>
-          </p:spPr>
-          <p:txBody>
-            <a:bodyPr wrap="none">
-              <a:spAutoFit/>
-            </a:bodyPr>
-            <a:lstStyle/>
-            <a:p>
-              <a:r>
-                <a:rPr lang="en-US" sz="3600" dirty="0">
-                  <a:solidFill>
-                    <a:prstClr val="black"/>
-                  </a:solidFill>
-                  <a:latin typeface="Segoe Marker"/>
-                  <a:ea typeface="+mj-ea"/>
-                  <a:cs typeface="+mj-cs"/>
-                </a:rPr>
-                <a:t>h</a:t>
-              </a:r>
-              <a:endParaRPr lang="ru-RU" sz="1400" dirty="0"/>
-            </a:p>
-          </p:txBody>
-        </p:sp>
-        <p:cxnSp>
-          <p:nvCxnSpPr>
-            <p:cNvPr id="45" name="Прямая соединительная линия 44"/>
-            <p:cNvCxnSpPr/>
-            <p:nvPr/>
-          </p:nvCxnSpPr>
-          <p:spPr>
-            <a:xfrm flipH="1">
-              <a:off x="8465003" y="5416244"/>
-              <a:ext cx="1590584" cy="3380"/>
-            </a:xfrm>
-            <a:prstGeom prst="line">
-              <a:avLst/>
-            </a:prstGeom>
-            <a:ln w="76200"/>
-          </p:spPr>
-          <p:style>
-            <a:lnRef idx="1">
-              <a:schemeClr val="dk1"/>
-            </a:lnRef>
-            <a:fillRef idx="0">
-              <a:schemeClr val="dk1"/>
-            </a:fillRef>
-            <a:effectRef idx="0">
-              <a:schemeClr val="dk1"/>
-            </a:effectRef>
-            <a:fontRef idx="minor">
-              <a:schemeClr val="tx1"/>
-            </a:fontRef>
-          </p:style>
-        </p:cxnSp>
-        <p:cxnSp>
-          <p:nvCxnSpPr>
-            <p:cNvPr id="46" name="Прямая соединительная линия 45"/>
-            <p:cNvCxnSpPr/>
-            <p:nvPr/>
-          </p:nvCxnSpPr>
-          <p:spPr>
-            <a:xfrm flipH="1">
-              <a:off x="8437707" y="5006806"/>
-              <a:ext cx="1590584" cy="3380"/>
-            </a:xfrm>
-            <a:prstGeom prst="line">
-              <a:avLst/>
-            </a:prstGeom>
-            <a:ln w="76200"/>
-          </p:spPr>
-          <p:style>
-            <a:lnRef idx="1">
-              <a:schemeClr val="dk1"/>
-            </a:lnRef>
-            <a:fillRef idx="0">
-              <a:schemeClr val="dk1"/>
-            </a:fillRef>
-            <a:effectRef idx="0">
-              <a:schemeClr val="dk1"/>
-            </a:effectRef>
-            <a:fontRef idx="minor">
-              <a:schemeClr val="tx1"/>
-            </a:fontRef>
-          </p:style>
-        </p:cxnSp>
-      </p:grpSp>
+              </a:rPr>
+              <a:t>DMux4Way</a:t>
+            </a:r>
+            <a:endParaRPr lang="ru-RU" sz="3100" dirty="0">
+              <a:solidFill>
+                <a:schemeClr val="tx1"/>
+              </a:solidFill>
+              <a:latin typeface="+mj-lt"/>
+            </a:endParaRPr>
+          </a:p>
+        </p:txBody>
+      </p:sp>
+      <p:cxnSp>
+        <p:nvCxnSpPr>
+          <p:cNvPr id="39" name="Прямая соединительная линия 38"/>
+          <p:cNvCxnSpPr/>
+          <p:nvPr/>
+        </p:nvCxnSpPr>
+        <p:spPr>
+          <a:xfrm flipH="1">
+            <a:off x="-2062561" y="4152817"/>
+            <a:ext cx="1615073" cy="0"/>
+          </a:xfrm>
+          <a:prstGeom prst="line">
+            <a:avLst/>
+          </a:prstGeom>
+          <a:ln w="76200"/>
+        </p:spPr>
+        <p:style>
+          <a:lnRef idx="1">
+            <a:schemeClr val="dk1"/>
+          </a:lnRef>
+          <a:fillRef idx="0">
+            <a:schemeClr val="dk1"/>
+          </a:fillRef>
+          <a:effectRef idx="0">
+            <a:schemeClr val="dk1"/>
+          </a:effectRef>
+          <a:fontRef idx="minor">
+            <a:schemeClr val="tx1"/>
+          </a:fontRef>
+        </p:style>
+      </p:cxnSp>
+      <p:cxnSp>
+        <p:nvCxnSpPr>
+          <p:cNvPr id="40" name="Прямая соединительная линия 39"/>
+          <p:cNvCxnSpPr/>
+          <p:nvPr/>
+        </p:nvCxnSpPr>
+        <p:spPr>
+          <a:xfrm flipH="1">
+            <a:off x="-2046073" y="4567798"/>
+            <a:ext cx="1590584" cy="3380"/>
+          </a:xfrm>
+          <a:prstGeom prst="line">
+            <a:avLst/>
+          </a:prstGeom>
+          <a:ln w="76200"/>
+        </p:spPr>
+        <p:style>
+          <a:lnRef idx="1">
+            <a:schemeClr val="dk1"/>
+          </a:lnRef>
+          <a:fillRef idx="0">
+            <a:schemeClr val="dk1"/>
+          </a:fillRef>
+          <a:effectRef idx="0">
+            <a:schemeClr val="dk1"/>
+          </a:effectRef>
+          <a:fontRef idx="minor">
+            <a:schemeClr val="tx1"/>
+          </a:fontRef>
+        </p:style>
+      </p:cxnSp>
+      <p:sp>
+        <p:nvSpPr>
+          <p:cNvPr id="41" name="Прямоугольник 40"/>
+          <p:cNvSpPr/>
+          <p:nvPr/>
+        </p:nvSpPr>
+        <p:spPr>
+          <a:xfrm flipH="1">
+            <a:off x="-861268" y="3572268"/>
+            <a:ext cx="377026" cy="646331"/>
+          </a:xfrm>
+          <a:prstGeom prst="rect">
+            <a:avLst/>
+          </a:prstGeom>
+        </p:spPr>
+        <p:txBody>
+          <a:bodyPr wrap="none">
+            <a:spAutoFit/>
+          </a:bodyPr>
+          <a:lstStyle/>
+          <a:p>
+            <a:r>
+              <a:rPr lang="en-US" sz="3600" dirty="0" smtClean="0">
+                <a:solidFill>
+                  <a:prstClr val="black"/>
+                </a:solidFill>
+                <a:latin typeface="Segoe Marker"/>
+                <a:ea typeface="+mj-ea"/>
+                <a:cs typeface="+mj-cs"/>
+              </a:rPr>
+              <a:t>e</a:t>
+            </a:r>
+            <a:endParaRPr lang="ru-RU" sz="1400" dirty="0"/>
+          </a:p>
+        </p:txBody>
+      </p:sp>
+      <p:sp>
+        <p:nvSpPr>
+          <p:cNvPr id="42" name="Прямоугольник 41"/>
+          <p:cNvSpPr/>
+          <p:nvPr/>
+        </p:nvSpPr>
+        <p:spPr>
+          <a:xfrm flipH="1">
+            <a:off x="-867306" y="4051072"/>
+            <a:ext cx="316112" cy="646331"/>
+          </a:xfrm>
+          <a:prstGeom prst="rect">
+            <a:avLst/>
+          </a:prstGeom>
+        </p:spPr>
+        <p:txBody>
+          <a:bodyPr wrap="none">
+            <a:spAutoFit/>
+          </a:bodyPr>
+          <a:lstStyle/>
+          <a:p>
+            <a:r>
+              <a:rPr lang="en-US" sz="3600" dirty="0">
+                <a:solidFill>
+                  <a:prstClr val="black"/>
+                </a:solidFill>
+                <a:latin typeface="Segoe Marker"/>
+                <a:ea typeface="+mj-ea"/>
+                <a:cs typeface="+mj-cs"/>
+              </a:rPr>
+              <a:t>f</a:t>
+            </a:r>
+            <a:endParaRPr lang="ru-RU" sz="1400" dirty="0"/>
+          </a:p>
+        </p:txBody>
+      </p:sp>
+      <p:sp>
+        <p:nvSpPr>
+          <p:cNvPr id="43" name="Прямоугольник 42"/>
+          <p:cNvSpPr/>
+          <p:nvPr/>
+        </p:nvSpPr>
+        <p:spPr>
+          <a:xfrm flipH="1">
+            <a:off x="-859002" y="4420711"/>
+            <a:ext cx="397866" cy="646331"/>
+          </a:xfrm>
+          <a:prstGeom prst="rect">
+            <a:avLst/>
+          </a:prstGeom>
+        </p:spPr>
+        <p:txBody>
+          <a:bodyPr wrap="none">
+            <a:spAutoFit/>
+          </a:bodyPr>
+          <a:lstStyle/>
+          <a:p>
+            <a:r>
+              <a:rPr lang="en-US" sz="3600" dirty="0">
+                <a:solidFill>
+                  <a:prstClr val="black"/>
+                </a:solidFill>
+                <a:latin typeface="Segoe Marker"/>
+                <a:ea typeface="+mj-ea"/>
+                <a:cs typeface="+mj-cs"/>
+              </a:rPr>
+              <a:t>g</a:t>
+            </a:r>
+            <a:endParaRPr lang="ru-RU" sz="1400" dirty="0"/>
+          </a:p>
+        </p:txBody>
+      </p:sp>
+      <p:sp>
+        <p:nvSpPr>
+          <p:cNvPr id="44" name="Прямоугольник 43"/>
+          <p:cNvSpPr/>
+          <p:nvPr/>
+        </p:nvSpPr>
+        <p:spPr>
+          <a:xfrm flipH="1">
+            <a:off x="-872650" y="4898383"/>
+            <a:ext cx="396262" cy="646331"/>
+          </a:xfrm>
+          <a:prstGeom prst="rect">
+            <a:avLst/>
+          </a:prstGeom>
+        </p:spPr>
+        <p:txBody>
+          <a:bodyPr wrap="none">
+            <a:spAutoFit/>
+          </a:bodyPr>
+          <a:lstStyle/>
+          <a:p>
+            <a:r>
+              <a:rPr lang="en-US" sz="3600" dirty="0">
+                <a:solidFill>
+                  <a:prstClr val="black"/>
+                </a:solidFill>
+                <a:latin typeface="Segoe Marker"/>
+                <a:ea typeface="+mj-ea"/>
+                <a:cs typeface="+mj-cs"/>
+              </a:rPr>
+              <a:t>h</a:t>
+            </a:r>
+            <a:endParaRPr lang="ru-RU" sz="1400" dirty="0"/>
+          </a:p>
+        </p:txBody>
+      </p:sp>
+      <p:cxnSp>
+        <p:nvCxnSpPr>
+          <p:cNvPr id="45" name="Прямая соединительная линия 44"/>
+          <p:cNvCxnSpPr/>
+          <p:nvPr/>
+        </p:nvCxnSpPr>
+        <p:spPr>
+          <a:xfrm flipH="1">
+            <a:off x="-2045393" y="5416244"/>
+            <a:ext cx="1590584" cy="3380"/>
+          </a:xfrm>
+          <a:prstGeom prst="line">
+            <a:avLst/>
+          </a:prstGeom>
+          <a:ln w="76200"/>
+        </p:spPr>
+        <p:style>
+          <a:lnRef idx="1">
+            <a:schemeClr val="dk1"/>
+          </a:lnRef>
+          <a:fillRef idx="0">
+            <a:schemeClr val="dk1"/>
+          </a:fillRef>
+          <a:effectRef idx="0">
+            <a:schemeClr val="dk1"/>
+          </a:effectRef>
+          <a:fontRef idx="minor">
+            <a:schemeClr val="tx1"/>
+          </a:fontRef>
+        </p:style>
+      </p:cxnSp>
+      <p:cxnSp>
+        <p:nvCxnSpPr>
+          <p:cNvPr id="46" name="Прямая соединительная линия 45"/>
+          <p:cNvCxnSpPr/>
+          <p:nvPr/>
+        </p:nvCxnSpPr>
+        <p:spPr>
+          <a:xfrm flipH="1">
+            <a:off x="-2057448" y="5010186"/>
+            <a:ext cx="1609960" cy="0"/>
+          </a:xfrm>
+          <a:prstGeom prst="line">
+            <a:avLst/>
+          </a:prstGeom>
+          <a:ln w="76200"/>
+        </p:spPr>
+        <p:style>
+          <a:lnRef idx="1">
+            <a:schemeClr val="dk1"/>
+          </a:lnRef>
+          <a:fillRef idx="0">
+            <a:schemeClr val="dk1"/>
+          </a:fillRef>
+          <a:effectRef idx="0">
+            <a:schemeClr val="dk1"/>
+          </a:effectRef>
+          <a:fontRef idx="minor">
+            <a:schemeClr val="tx1"/>
+          </a:fontRef>
+        </p:style>
+      </p:cxnSp>
       <p:pic>
         <p:nvPicPr>
           <p:cNvPr id="52" name="Рисунок 51"/>
@@ -18368,7 +18354,7 @@
         <p:spPr>
           <a:xfrm>
             <a:off x="1659218" y="1411444"/>
-            <a:ext cx="8873564" cy="4676248"/>
+            <a:ext cx="8873564" cy="4676247"/>
           </a:xfrm>
           <a:prstGeom prst="rect">
             <a:avLst/>
@@ -18392,6 +18378,233 @@
       </p:par>
     </p:tnLst>
   </p:timing>
+</p:sld>
+</file>
+
+<file path=ppt/slides/slide22.xml><?xml version="1.0" encoding="utf-8"?>
+<p:sld xmlns:a="http://schemas.openxmlformats.org/drawingml/2006/main" xmlns:r="http://schemas.openxmlformats.org/officeDocument/2006/relationships" xmlns:p="http://schemas.openxmlformats.org/presentationml/2006/main">
+  <p:cSld>
+    <p:spTree>
+      <p:nvGrpSpPr>
+        <p:cNvPr id="1" name=""/>
+        <p:cNvGrpSpPr/>
+        <p:nvPr/>
+      </p:nvGrpSpPr>
+      <p:grpSpPr>
+        <a:xfrm>
+          <a:off x="0" y="0"/>
+          <a:ext cx="0" cy="0"/>
+          <a:chOff x="0" y="0"/>
+          <a:chExt cx="0" cy="0"/>
+        </a:xfrm>
+      </p:grpSpPr>
+      <p:sp>
+        <p:nvSpPr>
+          <p:cNvPr id="2" name="Заголовок 1"/>
+          <p:cNvSpPr>
+            <a:spLocks noGrp="1"/>
+          </p:cNvSpPr>
+          <p:nvPr>
+            <p:ph type="title"/>
+          </p:nvPr>
+        </p:nvSpPr>
+        <p:spPr>
+          <a:xfrm>
+            <a:off x="979716" y="1584325"/>
+            <a:ext cx="10515600" cy="1325563"/>
+          </a:xfrm>
+        </p:spPr>
+        <p:txBody>
+          <a:bodyPr/>
+          <a:lstStyle/>
+          <a:p>
+            <a:pPr algn="ctr"/>
+            <a:r>
+              <a:rPr lang="ru-RU" dirty="0" smtClean="0"/>
+              <a:t>Спасибо за внимание</a:t>
+            </a:r>
+            <a:endParaRPr lang="ru-RU" dirty="0"/>
+          </a:p>
+        </p:txBody>
+      </p:sp>
+      <p:sp>
+        <p:nvSpPr>
+          <p:cNvPr id="3" name="Объект 2"/>
+          <p:cNvSpPr>
+            <a:spLocks noGrp="1"/>
+          </p:cNvSpPr>
+          <p:nvPr>
+            <p:ph idx="1"/>
+          </p:nvPr>
+        </p:nvSpPr>
+        <p:spPr>
+          <a:xfrm>
+            <a:off x="838200" y="3973739"/>
+            <a:ext cx="10515600" cy="2062602"/>
+          </a:xfrm>
+        </p:spPr>
+        <p:txBody>
+          <a:bodyPr/>
+          <a:lstStyle/>
+          <a:p>
+            <a:pPr marL="0" indent="0">
+              <a:lnSpc>
+                <a:spcPct val="150000"/>
+              </a:lnSpc>
+              <a:buNone/>
+            </a:pPr>
+            <a:r>
+              <a:rPr lang="en-US" dirty="0">
+                <a:hlinkClick r:id="rId2"/>
+              </a:rPr>
+              <a:t>http://www.nand2tetris.org</a:t>
+            </a:r>
+            <a:r>
+              <a:rPr lang="en-US" dirty="0" smtClean="0">
+                <a:hlinkClick r:id="rId2"/>
+              </a:rPr>
+              <a:t>/</a:t>
+            </a:r>
+            <a:endParaRPr lang="ru-RU" dirty="0" smtClean="0"/>
+          </a:p>
+          <a:p>
+            <a:pPr marL="0" indent="0">
+              <a:lnSpc>
+                <a:spcPct val="150000"/>
+              </a:lnSpc>
+              <a:buNone/>
+            </a:pPr>
+            <a:r>
+              <a:rPr lang="en-US" dirty="0">
+                <a:hlinkClick r:id="rId3"/>
+              </a:rPr>
+              <a:t>https://</a:t>
+            </a:r>
+            <a:r>
+              <a:rPr lang="en-US" dirty="0" smtClean="0">
+                <a:hlinkClick r:id="rId3"/>
+              </a:rPr>
+              <a:t>github.com/AndreySBer/nand2tetris</a:t>
+            </a:r>
+            <a:endParaRPr lang="ru-RU" dirty="0" smtClean="0"/>
+          </a:p>
+        </p:txBody>
+      </p:sp>
+      <p:sp>
+        <p:nvSpPr>
+          <p:cNvPr id="4" name="Номер слайда 3"/>
+          <p:cNvSpPr>
+            <a:spLocks noGrp="1"/>
+          </p:cNvSpPr>
+          <p:nvPr>
+            <p:ph type="sldNum" sz="quarter" idx="12"/>
+          </p:nvPr>
+        </p:nvSpPr>
+        <p:spPr/>
+        <p:txBody>
+          <a:bodyPr/>
+          <a:lstStyle/>
+          <a:p>
+            <a:fld id="{6636193E-5B45-4A2E-A5B3-C884793DE94F}" type="slidenum">
+              <a:rPr lang="ru-RU" smtClean="0"/>
+              <a:t>22</a:t>
+            </a:fld>
+            <a:endParaRPr lang="ru-RU"/>
+          </a:p>
+        </p:txBody>
+      </p:sp>
+      <p:pic>
+        <p:nvPicPr>
+          <p:cNvPr id="1026" name="Picture 2" descr="http://www.aha.io/assets/integration_logos/github-bb449e0ffbacbcb7f9c703db85b1cf0b.png"/>
+          <p:cNvPicPr>
+            <a:picLocks noChangeAspect="1" noChangeArrowheads="1"/>
+          </p:cNvPicPr>
+          <p:nvPr/>
+        </p:nvPicPr>
+        <p:blipFill>
+          <a:blip r:embed="rId4" cstate="print">
+            <a:extLst>
+              <a:ext uri="{28A0092B-C50C-407E-A947-70E740481C1C}">
+                <a14:useLocalDpi xmlns:a14="http://schemas.microsoft.com/office/drawing/2010/main" val="0"/>
+              </a:ext>
+            </a:extLst>
+          </a:blip>
+          <a:srcRect/>
+          <a:stretch>
+            <a:fillRect/>
+          </a:stretch>
+        </p:blipFill>
+        <p:spPr bwMode="auto">
+          <a:xfrm>
+            <a:off x="7848148" y="4650546"/>
+            <a:ext cx="3647168" cy="1351884"/>
+          </a:xfrm>
+          <a:prstGeom prst="rect">
+            <a:avLst/>
+          </a:prstGeom>
+          <a:noFill/>
+          <a:extLst>
+            <a:ext uri="{909E8E84-426E-40DD-AFC4-6F175D3DCCD1}">
+              <a14:hiddenFill xmlns:a14="http://schemas.microsoft.com/office/drawing/2010/main">
+                <a:solidFill>
+                  <a:srgbClr val="FFFFFF"/>
+                </a:solidFill>
+              </a14:hiddenFill>
+            </a:ext>
+          </a:extLst>
+        </p:spPr>
+      </p:pic>
+      <p:pic>
+        <p:nvPicPr>
+          <p:cNvPr id="1028" name="Picture 4" descr="http://www.nand2tetris.org/banner.png"/>
+          <p:cNvPicPr>
+            <a:picLocks noChangeAspect="1" noChangeArrowheads="1"/>
+          </p:cNvPicPr>
+          <p:nvPr/>
+        </p:nvPicPr>
+        <p:blipFill>
+          <a:blip r:embed="rId5" cstate="print">
+            <a:extLst>
+              <a:ext uri="{28A0092B-C50C-407E-A947-70E740481C1C}">
+                <a14:useLocalDpi xmlns:a14="http://schemas.microsoft.com/office/drawing/2010/main" val="0"/>
+              </a:ext>
+            </a:extLst>
+          </a:blip>
+          <a:srcRect/>
+          <a:stretch>
+            <a:fillRect/>
+          </a:stretch>
+        </p:blipFill>
+        <p:spPr bwMode="auto">
+          <a:xfrm>
+            <a:off x="8168370" y="3597520"/>
+            <a:ext cx="3006724" cy="1041336"/>
+          </a:xfrm>
+          <a:prstGeom prst="rect">
+            <a:avLst/>
+          </a:prstGeom>
+          <a:noFill/>
+          <a:extLst>
+            <a:ext uri="{909E8E84-426E-40DD-AFC4-6F175D3DCCD1}">
+              <a14:hiddenFill xmlns:a14="http://schemas.microsoft.com/office/drawing/2010/main">
+                <a:solidFill>
+                  <a:srgbClr val="FFFFFF"/>
+                </a:solidFill>
+              </a14:hiddenFill>
+            </a:ext>
+          </a:extLst>
+        </p:spPr>
+      </p:pic>
+    </p:spTree>
+    <p:extLst>
+      <p:ext uri="{BB962C8B-B14F-4D97-AF65-F5344CB8AC3E}">
+        <p14:creationId xmlns:p14="http://schemas.microsoft.com/office/powerpoint/2010/main" val="3802653039"/>
+      </p:ext>
+    </p:extLst>
+  </p:cSld>
+  <p:clrMapOvr>
+    <a:masterClrMapping/>
+  </p:clrMapOvr>
 </p:sld>
 </file>
 
@@ -18889,13 +19102,6 @@
               </a:rPr>
               <a:t>[3]), </a:t>
             </a:r>
-            <a:r>
-              <a:rPr lang="en-US" sz="2800" b="1" dirty="0" smtClean="0">
-                <a:latin typeface="Courier New" panose="02070309020205020404" pitchFamily="49" charset="0"/>
-                <a:cs typeface="Courier New" panose="02070309020205020404" pitchFamily="49" charset="0"/>
-              </a:rPr>
-              <a:t/>
-            </a:r>
             <a:br>
               <a:rPr lang="en-US" sz="2800" b="1" dirty="0" smtClean="0">
                 <a:latin typeface="Courier New" panose="02070309020205020404" pitchFamily="49" charset="0"/>
@@ -18907,14 +19113,7 @@
                 <a:latin typeface="Courier New" panose="02070309020205020404" pitchFamily="49" charset="0"/>
                 <a:cs typeface="Courier New" panose="02070309020205020404" pitchFamily="49" charset="0"/>
               </a:rPr>
-              <a:t>DMux4Way(in</a:t>
-            </a:r>
-            <a:r>
-              <a:rPr lang="en-US" sz="2800" b="1" dirty="0" smtClean="0">
-                <a:latin typeface="Courier New" panose="02070309020205020404" pitchFamily="49" charset="0"/>
-                <a:cs typeface="Courier New" panose="02070309020205020404" pitchFamily="49" charset="0"/>
-              </a:rPr>
-              <a:t>, </a:t>
+              <a:t>DMux4Way(in, </a:t>
             </a:r>
             <a:r>
               <a:rPr lang="en-US" sz="2800" b="1" dirty="0" err="1" smtClean="0">

</xml_diff>